<commit_message>
Bretti ppt í pdf
</commit_message>
<xml_diff>
--- a/Viðnám Ω (resistor)_led.pptx
+++ b/Viðnám Ω (resistor)_led.pptx
@@ -241,7 +241,7 @@
           <a:p>
             <a:fld id="{1C4DF306-22BF-42D8-936A-27912ECF1D56}" type="datetimeFigureOut">
               <a:rPr lang="en-US" smtClean="0"/>
-              <a:t>1/15/2016</a:t>
+              <a:t>12/14/2016</a:t>
             </a:fld>
             <a:endParaRPr lang="en-US"/>
           </a:p>
@@ -411,7 +411,7 @@
           <a:p>
             <a:fld id="{1C4DF306-22BF-42D8-936A-27912ECF1D56}" type="datetimeFigureOut">
               <a:rPr lang="en-US" smtClean="0"/>
-              <a:t>1/15/2016</a:t>
+              <a:t>12/14/2016</a:t>
             </a:fld>
             <a:endParaRPr lang="en-US"/>
           </a:p>
@@ -591,7 +591,7 @@
           <a:p>
             <a:fld id="{1C4DF306-22BF-42D8-936A-27912ECF1D56}" type="datetimeFigureOut">
               <a:rPr lang="en-US" smtClean="0"/>
-              <a:t>1/15/2016</a:t>
+              <a:t>12/14/2016</a:t>
             </a:fld>
             <a:endParaRPr lang="en-US"/>
           </a:p>
@@ -761,7 +761,7 @@
           <a:p>
             <a:fld id="{1C4DF306-22BF-42D8-936A-27912ECF1D56}" type="datetimeFigureOut">
               <a:rPr lang="en-US" smtClean="0"/>
-              <a:t>1/15/2016</a:t>
+              <a:t>12/14/2016</a:t>
             </a:fld>
             <a:endParaRPr lang="en-US"/>
           </a:p>
@@ -1007,7 +1007,7 @@
           <a:p>
             <a:fld id="{1C4DF306-22BF-42D8-936A-27912ECF1D56}" type="datetimeFigureOut">
               <a:rPr lang="en-US" smtClean="0"/>
-              <a:t>1/15/2016</a:t>
+              <a:t>12/14/2016</a:t>
             </a:fld>
             <a:endParaRPr lang="en-US"/>
           </a:p>
@@ -1239,7 +1239,7 @@
           <a:p>
             <a:fld id="{1C4DF306-22BF-42D8-936A-27912ECF1D56}" type="datetimeFigureOut">
               <a:rPr lang="en-US" smtClean="0"/>
-              <a:t>1/15/2016</a:t>
+              <a:t>12/14/2016</a:t>
             </a:fld>
             <a:endParaRPr lang="en-US"/>
           </a:p>
@@ -1606,7 +1606,7 @@
           <a:p>
             <a:fld id="{1C4DF306-22BF-42D8-936A-27912ECF1D56}" type="datetimeFigureOut">
               <a:rPr lang="en-US" smtClean="0"/>
-              <a:t>1/15/2016</a:t>
+              <a:t>12/14/2016</a:t>
             </a:fld>
             <a:endParaRPr lang="en-US"/>
           </a:p>
@@ -1724,7 +1724,7 @@
           <a:p>
             <a:fld id="{1C4DF306-22BF-42D8-936A-27912ECF1D56}" type="datetimeFigureOut">
               <a:rPr lang="en-US" smtClean="0"/>
-              <a:t>1/15/2016</a:t>
+              <a:t>12/14/2016</a:t>
             </a:fld>
             <a:endParaRPr lang="en-US"/>
           </a:p>
@@ -1819,7 +1819,7 @@
           <a:p>
             <a:fld id="{1C4DF306-22BF-42D8-936A-27912ECF1D56}" type="datetimeFigureOut">
               <a:rPr lang="en-US" smtClean="0"/>
-              <a:t>1/15/2016</a:t>
+              <a:t>12/14/2016</a:t>
             </a:fld>
             <a:endParaRPr lang="en-US"/>
           </a:p>
@@ -2096,7 +2096,7 @@
           <a:p>
             <a:fld id="{1C4DF306-22BF-42D8-936A-27912ECF1D56}" type="datetimeFigureOut">
               <a:rPr lang="en-US" smtClean="0"/>
-              <a:t>1/15/2016</a:t>
+              <a:t>12/14/2016</a:t>
             </a:fld>
             <a:endParaRPr lang="en-US"/>
           </a:p>
@@ -2349,7 +2349,7 @@
           <a:p>
             <a:fld id="{1C4DF306-22BF-42D8-936A-27912ECF1D56}" type="datetimeFigureOut">
               <a:rPr lang="en-US" smtClean="0"/>
-              <a:t>1/15/2016</a:t>
+              <a:t>12/14/2016</a:t>
             </a:fld>
             <a:endParaRPr lang="en-US"/>
           </a:p>
@@ -2562,7 +2562,7 @@
           <a:p>
             <a:fld id="{1C4DF306-22BF-42D8-936A-27912ECF1D56}" type="datetimeFigureOut">
               <a:rPr lang="en-US" smtClean="0"/>
-              <a:t>1/15/2016</a:t>
+              <a:t>12/14/2016</a:t>
             </a:fld>
             <a:endParaRPr lang="en-US"/>
           </a:p>
@@ -3073,15 +3073,19 @@
           <a:p>
             <a:r>
               <a:rPr lang="is-IS" dirty="0" smtClean="0"/>
-              <a:t>í gegnum </a:t>
-            </a:r>
-            <a:r>
-              <a:rPr lang="is-IS" dirty="0" err="1" smtClean="0"/>
-              <a:t>sigí</a:t>
+              <a:t>í </a:t>
+            </a:r>
+            <a:r>
+              <a:rPr lang="is-IS" smtClean="0"/>
+              <a:t>gegnum </a:t>
+            </a:r>
+            <a:r>
+              <a:rPr lang="is-IS" smtClean="0"/>
+              <a:t>sig í </a:t>
             </a:r>
             <a:r>
               <a:rPr lang="is-IS" dirty="0" smtClean="0"/>
-              <a:t> báðar áttir.</a:t>
+              <a:t>báðar áttir.</a:t>
             </a:r>
           </a:p>
           <a:p>
@@ -3924,7 +3928,7 @@
   <a:extraClrSchemeLst/>
   <a:extLst>
     <a:ext uri="{05A4C25C-085E-4340-85A3-A5531E510DB2}">
-      <thm15:themeFamily xmlns:thm15="http://schemas.microsoft.com/office/thememl/2012/main" name="Office Theme" id="{62F939B6-93AF-4DB8-9C6B-D6C7DFDC589F}" vid="{4A3C46E8-61CC-4603-A589-7422A47A8E4A}"/>
+      <thm15:themeFamily xmlns:thm15="http://schemas.microsoft.com/office/thememl/2012/main" xmlns="" name="Office Theme" id="{62F939B6-93AF-4DB8-9C6B-D6C7DFDC589F}" vid="{4A3C46E8-61CC-4603-A589-7422A47A8E4A}"/>
     </a:ext>
   </a:extLst>
 </a:theme>

</xml_diff>